<commit_message>
Update if/else sample. Update exersise data.
</commit_message>
<xml_diff>
--- a/tai-lieu/hocfe-buoi6-javascript1/Bai7-LamQuenVoiJavascript.pptx
+++ b/tai-lieu/hocfe-buoi6-javascript1/Bai7-LamQuenVoiJavascript.pptx
@@ -365,7 +365,7 @@
           <a:p>
             <a:fld id="{7109C2E1-7128-4CF3-932E-985565988C28}" type="datetimeFigureOut">
               <a:rPr lang="en-US" smtClean="0"/>
-              <a:t>7/23/2020</a:t>
+              <a:t>10/2/2021</a:t>
             </a:fld>
             <a:endParaRPr lang="en-US"/>
           </a:p>
@@ -535,7 +535,7 @@
           <a:p>
             <a:fld id="{7109C2E1-7128-4CF3-932E-985565988C28}" type="datetimeFigureOut">
               <a:rPr lang="en-US" smtClean="0"/>
-              <a:t>7/23/2020</a:t>
+              <a:t>10/2/2021</a:t>
             </a:fld>
             <a:endParaRPr lang="en-US"/>
           </a:p>
@@ -715,7 +715,7 @@
           <a:p>
             <a:fld id="{7109C2E1-7128-4CF3-932E-985565988C28}" type="datetimeFigureOut">
               <a:rPr lang="en-US" smtClean="0"/>
-              <a:t>7/23/2020</a:t>
+              <a:t>10/2/2021</a:t>
             </a:fld>
             <a:endParaRPr lang="en-US"/>
           </a:p>
@@ -885,7 +885,7 @@
           <a:p>
             <a:fld id="{7109C2E1-7128-4CF3-932E-985565988C28}" type="datetimeFigureOut">
               <a:rPr lang="en-US" smtClean="0"/>
-              <a:t>7/23/2020</a:t>
+              <a:t>10/2/2021</a:t>
             </a:fld>
             <a:endParaRPr lang="en-US"/>
           </a:p>
@@ -1131,7 +1131,7 @@
           <a:p>
             <a:fld id="{7109C2E1-7128-4CF3-932E-985565988C28}" type="datetimeFigureOut">
               <a:rPr lang="en-US" smtClean="0"/>
-              <a:t>7/23/2020</a:t>
+              <a:t>10/2/2021</a:t>
             </a:fld>
             <a:endParaRPr lang="en-US"/>
           </a:p>
@@ -1419,7 +1419,7 @@
           <a:p>
             <a:fld id="{7109C2E1-7128-4CF3-932E-985565988C28}" type="datetimeFigureOut">
               <a:rPr lang="en-US" smtClean="0"/>
-              <a:t>7/23/2020</a:t>
+              <a:t>10/2/2021</a:t>
             </a:fld>
             <a:endParaRPr lang="en-US"/>
           </a:p>
@@ -1841,7 +1841,7 @@
           <a:p>
             <a:fld id="{7109C2E1-7128-4CF3-932E-985565988C28}" type="datetimeFigureOut">
               <a:rPr lang="en-US" smtClean="0"/>
-              <a:t>7/23/2020</a:t>
+              <a:t>10/2/2021</a:t>
             </a:fld>
             <a:endParaRPr lang="en-US"/>
           </a:p>
@@ -1959,7 +1959,7 @@
           <a:p>
             <a:fld id="{7109C2E1-7128-4CF3-932E-985565988C28}" type="datetimeFigureOut">
               <a:rPr lang="en-US" smtClean="0"/>
-              <a:t>7/23/2020</a:t>
+              <a:t>10/2/2021</a:t>
             </a:fld>
             <a:endParaRPr lang="en-US"/>
           </a:p>
@@ -2054,7 +2054,7 @@
           <a:p>
             <a:fld id="{7109C2E1-7128-4CF3-932E-985565988C28}" type="datetimeFigureOut">
               <a:rPr lang="en-US" smtClean="0"/>
-              <a:t>7/23/2020</a:t>
+              <a:t>10/2/2021</a:t>
             </a:fld>
             <a:endParaRPr lang="en-US"/>
           </a:p>
@@ -2331,7 +2331,7 @@
           <a:p>
             <a:fld id="{7109C2E1-7128-4CF3-932E-985565988C28}" type="datetimeFigureOut">
               <a:rPr lang="en-US" smtClean="0"/>
-              <a:t>7/23/2020</a:t>
+              <a:t>10/2/2021</a:t>
             </a:fld>
             <a:endParaRPr lang="en-US"/>
           </a:p>
@@ -2584,7 +2584,7 @@
           <a:p>
             <a:fld id="{7109C2E1-7128-4CF3-932E-985565988C28}" type="datetimeFigureOut">
               <a:rPr lang="en-US" smtClean="0"/>
-              <a:t>7/23/2020</a:t>
+              <a:t>10/2/2021</a:t>
             </a:fld>
             <a:endParaRPr lang="en-US"/>
           </a:p>
@@ -2797,7 +2797,7 @@
           <a:p>
             <a:fld id="{7109C2E1-7128-4CF3-932E-985565988C28}" type="datetimeFigureOut">
               <a:rPr lang="en-US" smtClean="0"/>
-              <a:t>7/23/2020</a:t>
+              <a:t>10/2/2021</a:t>
             </a:fld>
             <a:endParaRPr lang="en-US"/>
           </a:p>
@@ -14500,17 +14500,7 @@
                 <a:latin typeface="Arial" panose="020B0604020202020204" pitchFamily="34" charset="0"/>
                 <a:cs typeface="Arial" panose="020B0604020202020204" pitchFamily="34" charset="0"/>
               </a:rPr>
-              <a:t>V</a:t>
-            </a:r>
-            <a:r>
-              <a:rPr lang="en-US" sz="2400" b="1" dirty="0" smtClean="0">
-                <a:solidFill>
-                  <a:srgbClr val="FF0000"/>
-                </a:solidFill>
-                <a:latin typeface="Arial" panose="020B0604020202020204" pitchFamily="34" charset="0"/>
-                <a:cs typeface="Arial" panose="020B0604020202020204" pitchFamily="34" charset="0"/>
-              </a:rPr>
-              <a:t>.   </a:t>
+              <a:t>V.   </a:t>
             </a:r>
             <a:r>
               <a:rPr lang="en-US" sz="2400" b="1" dirty="0" err="1" smtClean="0">
@@ -15794,17 +15784,7 @@
                 <a:latin typeface="Arial" panose="020B0604020202020204" pitchFamily="34" charset="0"/>
                 <a:cs typeface="Arial" panose="020B0604020202020204" pitchFamily="34" charset="0"/>
               </a:rPr>
-              <a:t>V</a:t>
-            </a:r>
-            <a:r>
-              <a:rPr lang="en-US" sz="2400" b="1" dirty="0" smtClean="0">
-                <a:solidFill>
-                  <a:srgbClr val="FF0000"/>
-                </a:solidFill>
-                <a:latin typeface="Arial" panose="020B0604020202020204" pitchFamily="34" charset="0"/>
-                <a:cs typeface="Arial" panose="020B0604020202020204" pitchFamily="34" charset="0"/>
-              </a:rPr>
-              <a:t>.   </a:t>
+              <a:t>V.   </a:t>
             </a:r>
             <a:r>
               <a:rPr lang="en-US" sz="2400" b="1" dirty="0" err="1" smtClean="0">
@@ -16221,7 +16201,7 @@
         </p:blipFill>
         <p:spPr>
           <a:xfrm>
-            <a:off x="304800" y="2971800"/>
+            <a:off x="329421" y="2971798"/>
             <a:ext cx="4905375" cy="1666875"/>
           </a:xfrm>
           <a:prstGeom prst="rect">
@@ -16547,17 +16527,7 @@
                 <a:latin typeface="Arial" panose="020B0604020202020204" pitchFamily="34" charset="0"/>
                 <a:cs typeface="Arial" panose="020B0604020202020204" pitchFamily="34" charset="0"/>
               </a:rPr>
-              <a:t>V</a:t>
-            </a:r>
-            <a:r>
-              <a:rPr lang="en-US" sz="2400" b="1" dirty="0" smtClean="0">
-                <a:solidFill>
-                  <a:srgbClr val="FF0000"/>
-                </a:solidFill>
-                <a:latin typeface="Arial" panose="020B0604020202020204" pitchFamily="34" charset="0"/>
-                <a:cs typeface="Arial" panose="020B0604020202020204" pitchFamily="34" charset="0"/>
-              </a:rPr>
-              <a:t>.   </a:t>
+              <a:t>V.   </a:t>
             </a:r>
             <a:r>
               <a:rPr lang="en-US" sz="2400" b="1" dirty="0" err="1" smtClean="0">
@@ -17348,17 +17318,7 @@
                 <a:latin typeface="Arial" panose="020B0604020202020204" pitchFamily="34" charset="0"/>
                 <a:cs typeface="Arial" panose="020B0604020202020204" pitchFamily="34" charset="0"/>
               </a:rPr>
-              <a:t>V</a:t>
-            </a:r>
-            <a:r>
-              <a:rPr lang="en-US" sz="2400" b="1" dirty="0" smtClean="0">
-                <a:solidFill>
-                  <a:srgbClr val="FF0000"/>
-                </a:solidFill>
-                <a:latin typeface="Arial" panose="020B0604020202020204" pitchFamily="34" charset="0"/>
-                <a:cs typeface="Arial" panose="020B0604020202020204" pitchFamily="34" charset="0"/>
-              </a:rPr>
-              <a:t>.   </a:t>
+              <a:t>V.   </a:t>
             </a:r>
             <a:r>
               <a:rPr lang="en-US" sz="2400" b="1" dirty="0" err="1" smtClean="0">
@@ -18994,17 +18954,7 @@
                 <a:latin typeface="Arial" panose="020B0604020202020204" pitchFamily="34" charset="0"/>
                 <a:cs typeface="Arial" panose="020B0604020202020204" pitchFamily="34" charset="0"/>
               </a:rPr>
-              <a:t>V</a:t>
-            </a:r>
-            <a:r>
-              <a:rPr lang="en-US" sz="2400" b="1" dirty="0" smtClean="0">
-                <a:solidFill>
-                  <a:srgbClr val="FF0000"/>
-                </a:solidFill>
-                <a:latin typeface="Arial" panose="020B0604020202020204" pitchFamily="34" charset="0"/>
-                <a:cs typeface="Arial" panose="020B0604020202020204" pitchFamily="34" charset="0"/>
-              </a:rPr>
-              <a:t>.   </a:t>
+              <a:t>V.   </a:t>
             </a:r>
             <a:r>
               <a:rPr lang="en-US" sz="2400" b="1" dirty="0" err="1" smtClean="0">
@@ -19686,17 +19636,7 @@
                 <a:latin typeface="Arial" panose="020B0604020202020204" pitchFamily="34" charset="0"/>
                 <a:cs typeface="Arial" panose="020B0604020202020204" pitchFamily="34" charset="0"/>
               </a:rPr>
-              <a:t>V</a:t>
-            </a:r>
-            <a:r>
-              <a:rPr lang="en-US" sz="2400" b="1" dirty="0" smtClean="0">
-                <a:solidFill>
-                  <a:srgbClr val="FF0000"/>
-                </a:solidFill>
-                <a:latin typeface="Arial" panose="020B0604020202020204" pitchFamily="34" charset="0"/>
-                <a:cs typeface="Arial" panose="020B0604020202020204" pitchFamily="34" charset="0"/>
-              </a:rPr>
-              <a:t>.   </a:t>
+              <a:t>V.   </a:t>
             </a:r>
             <a:r>
               <a:rPr lang="en-US" sz="2400" b="1" dirty="0" err="1" smtClean="0">
@@ -20670,17 +20610,7 @@
                 <a:latin typeface="Arial" panose="020B0604020202020204" pitchFamily="34" charset="0"/>
                 <a:cs typeface="Arial" panose="020B0604020202020204" pitchFamily="34" charset="0"/>
               </a:rPr>
-              <a:t>V</a:t>
-            </a:r>
-            <a:r>
-              <a:rPr lang="en-US" sz="2400" b="1" dirty="0" smtClean="0">
-                <a:solidFill>
-                  <a:srgbClr val="FF0000"/>
-                </a:solidFill>
-                <a:latin typeface="Arial" panose="020B0604020202020204" pitchFamily="34" charset="0"/>
-                <a:cs typeface="Arial" panose="020B0604020202020204" pitchFamily="34" charset="0"/>
-              </a:rPr>
-              <a:t>.   </a:t>
+              <a:t>V.   </a:t>
             </a:r>
             <a:r>
               <a:rPr lang="en-US" sz="2400" b="1" dirty="0" err="1" smtClean="0">
@@ -21909,13 +21839,6 @@
               </a:rPr>
               <a:t> 16.</a:t>
             </a:r>
-            <a:endParaRPr lang="en-US" sz="2400" b="1" dirty="0">
-              <a:solidFill>
-                <a:srgbClr val="FF0000"/>
-              </a:solidFill>
-              <a:latin typeface="Arial" panose="020B0604020202020204" pitchFamily="34" charset="0"/>
-              <a:cs typeface="Arial" panose="020B0604020202020204" pitchFamily="34" charset="0"/>
-            </a:endParaRPr>
           </a:p>
         </p:txBody>
       </p:sp>
@@ -22145,7 +22068,7 @@
         <p:spPr>
           <a:xfrm>
             <a:off x="-9334" y="914400"/>
-            <a:ext cx="9153334" cy="4154984"/>
+            <a:ext cx="9153334" cy="6247864"/>
           </a:xfrm>
           <a:prstGeom prst="rect">
             <a:avLst/>
@@ -22272,24 +22195,24 @@
               <a:buChar char="-"/>
             </a:pPr>
             <a:r>
-              <a:rPr lang="vi-VN" sz="2400" dirty="0" smtClean="0">
+              <a:rPr lang="vi-VN" sz="1200" dirty="0" smtClean="0">
                 <a:cs typeface="Arial" panose="020B0604020202020204" pitchFamily="34" charset="0"/>
               </a:rPr>
               <a:t>Điểm </a:t>
             </a:r>
             <a:r>
-              <a:rPr lang="vi-VN" sz="2400" dirty="0">
+              <a:rPr lang="vi-VN" sz="1200" dirty="0">
                 <a:cs typeface="Arial" panose="020B0604020202020204" pitchFamily="34" charset="0"/>
               </a:rPr>
               <a:t>trung bình &gt;= 9.0 là hạng A</a:t>
             </a:r>
             <a:r>
-              <a:rPr lang="vi-VN" sz="2400" dirty="0" smtClean="0">
+              <a:rPr lang="vi-VN" sz="1200" dirty="0" smtClean="0">
                 <a:cs typeface="Arial" panose="020B0604020202020204" pitchFamily="34" charset="0"/>
               </a:rPr>
               <a:t>.</a:t>
             </a:r>
-            <a:endParaRPr lang="en-US" sz="2400" dirty="0" smtClean="0">
+            <a:endParaRPr lang="en-US" sz="1200" dirty="0" smtClean="0">
               <a:cs typeface="Arial" panose="020B0604020202020204" pitchFamily="34" charset="0"/>
             </a:endParaRPr>
           </a:p>
@@ -22299,24 +22222,24 @@
               <a:buChar char="-"/>
             </a:pPr>
             <a:r>
-              <a:rPr lang="vi-VN" sz="2400" dirty="0" smtClean="0">
+              <a:rPr lang="vi-VN" sz="1200" dirty="0" smtClean="0">
                 <a:cs typeface="Arial" panose="020B0604020202020204" pitchFamily="34" charset="0"/>
               </a:rPr>
               <a:t>Điểm </a:t>
             </a:r>
             <a:r>
-              <a:rPr lang="vi-VN" sz="2400" dirty="0">
+              <a:rPr lang="vi-VN" sz="1200" dirty="0">
                 <a:cs typeface="Arial" panose="020B0604020202020204" pitchFamily="34" charset="0"/>
               </a:rPr>
               <a:t>trung bình &gt;=7.0 và &lt; 9.0 là hạng </a:t>
             </a:r>
             <a:r>
-              <a:rPr lang="vi-VN" sz="2400" dirty="0" smtClean="0">
+              <a:rPr lang="vi-VN" sz="1200" dirty="0" smtClean="0">
                 <a:cs typeface="Arial" panose="020B0604020202020204" pitchFamily="34" charset="0"/>
               </a:rPr>
               <a:t>B</a:t>
             </a:r>
-            <a:endParaRPr lang="en-US" sz="2400" dirty="0" smtClean="0">
+            <a:endParaRPr lang="en-US" sz="1200" dirty="0" smtClean="0">
               <a:cs typeface="Arial" panose="020B0604020202020204" pitchFamily="34" charset="0"/>
             </a:endParaRPr>
           </a:p>
@@ -22326,24 +22249,24 @@
               <a:buChar char="-"/>
             </a:pPr>
             <a:r>
-              <a:rPr lang="vi-VN" sz="2400" dirty="0" smtClean="0">
+              <a:rPr lang="vi-VN" sz="1200" dirty="0" smtClean="0">
                 <a:cs typeface="Arial" panose="020B0604020202020204" pitchFamily="34" charset="0"/>
               </a:rPr>
               <a:t>Điểm </a:t>
             </a:r>
             <a:r>
-              <a:rPr lang="vi-VN" sz="2400" dirty="0">
+              <a:rPr lang="vi-VN" sz="1200" dirty="0">
                 <a:cs typeface="Arial" panose="020B0604020202020204" pitchFamily="34" charset="0"/>
               </a:rPr>
               <a:t>trung bình &gt;=5.0 và &lt; 7.0 là hạng </a:t>
             </a:r>
             <a:r>
-              <a:rPr lang="vi-VN" sz="2400" dirty="0" smtClean="0">
+              <a:rPr lang="vi-VN" sz="1200" dirty="0" smtClean="0">
                 <a:cs typeface="Arial" panose="020B0604020202020204" pitchFamily="34" charset="0"/>
               </a:rPr>
               <a:t>C</a:t>
             </a:r>
-            <a:endParaRPr lang="en-US" sz="2400" dirty="0" smtClean="0">
+            <a:endParaRPr lang="en-US" sz="1200" dirty="0" smtClean="0">
               <a:cs typeface="Arial" panose="020B0604020202020204" pitchFamily="34" charset="0"/>
             </a:endParaRPr>
           </a:p>
@@ -22353,26 +22276,103 @@
               <a:buChar char="-"/>
             </a:pPr>
             <a:r>
-              <a:rPr lang="vi-VN" sz="2400" dirty="0" smtClean="0">
+              <a:rPr lang="vi-VN" sz="1200" dirty="0" smtClean="0">
                 <a:cs typeface="Arial" panose="020B0604020202020204" pitchFamily="34" charset="0"/>
               </a:rPr>
               <a:t>Điểm </a:t>
             </a:r>
             <a:r>
-              <a:rPr lang="vi-VN" sz="2400" dirty="0">
+              <a:rPr lang="vi-VN" sz="1200" dirty="0">
                 <a:cs typeface="Arial" panose="020B0604020202020204" pitchFamily="34" charset="0"/>
               </a:rPr>
               <a:t>trung bình &lt;5.0 là hạng </a:t>
             </a:r>
             <a:r>
-              <a:rPr lang="vi-VN" sz="2400" dirty="0" smtClean="0">
+              <a:rPr lang="vi-VN" sz="1200" dirty="0" smtClean="0">
                 <a:cs typeface="Arial" panose="020B0604020202020204" pitchFamily="34" charset="0"/>
               </a:rPr>
               <a:t>F</a:t>
             </a:r>
-            <a:endParaRPr lang="en-US" sz="2400" dirty="0" smtClean="0">
+            <a:endParaRPr lang="en-US" sz="1200" dirty="0" smtClean="0">
               <a:cs typeface="Arial" panose="020B0604020202020204" pitchFamily="34" charset="0"/>
             </a:endParaRPr>
+          </a:p>
+          <a:p>
+            <a:pPr lvl="1"/>
+            <a:endParaRPr lang="en-US" sz="2400" dirty="0">
+              <a:cs typeface="Arial" panose="020B0604020202020204" pitchFamily="34" charset="0"/>
+            </a:endParaRPr>
+          </a:p>
+          <a:p>
+            <a:r>
+              <a:rPr lang="en-US" sz="1600" dirty="0" smtClean="0"/>
+              <a:t>[</a:t>
+            </a:r>
+            <a:endParaRPr lang="en-US" sz="1600" dirty="0"/>
+          </a:p>
+          <a:p>
+            <a:r>
+              <a:rPr lang="en-US" sz="1600" dirty="0"/>
+              <a:t>                {"ten": "Nguyen Van A", "diem": 2},</a:t>
+            </a:r>
+          </a:p>
+          <a:p>
+            <a:r>
+              <a:rPr lang="en-US" sz="1600" dirty="0"/>
+              <a:t>                {"ten": "Nguyen Van B", "diem": 8},</a:t>
+            </a:r>
+          </a:p>
+          <a:p>
+            <a:r>
+              <a:rPr lang="en-US" sz="1600" dirty="0"/>
+              <a:t>                {"ten": "Nguyen Van C", "diem": 6},</a:t>
+            </a:r>
+          </a:p>
+          <a:p>
+            <a:r>
+              <a:rPr lang="en-US" sz="1600" dirty="0"/>
+              <a:t>                {"ten": "Nguyen Van D", "diem": 9},</a:t>
+            </a:r>
+          </a:p>
+          <a:p>
+            <a:r>
+              <a:rPr lang="en-US" sz="1600" dirty="0"/>
+              <a:t>                {"ten": "Nguyen Van E", "diem": 7},</a:t>
+            </a:r>
+          </a:p>
+          <a:p>
+            <a:r>
+              <a:rPr lang="en-US" sz="1600" dirty="0"/>
+              <a:t>                {"ten": "Nguyen Van F", "diem": 2}</a:t>
+            </a:r>
+          </a:p>
+          <a:p>
+            <a:r>
+              <a:rPr lang="en-US" sz="1600" dirty="0"/>
+              <a:t> </a:t>
+            </a:r>
+            <a:r>
+              <a:rPr lang="en-US" sz="1600" dirty="0" smtClean="0"/>
+              <a:t>]</a:t>
+            </a:r>
+          </a:p>
+          <a:p>
+            <a:endParaRPr lang="en-US" sz="1600" dirty="0"/>
+          </a:p>
+          <a:p>
+            <a:r>
+              <a:rPr lang="en-US" sz="1600" dirty="0" smtClean="0"/>
+              <a:t>Vi du in </a:t>
+            </a:r>
+            <a:r>
+              <a:rPr lang="en-US" sz="1600" dirty="0" err="1" smtClean="0"/>
+              <a:t>ra</a:t>
+            </a:r>
+            <a:r>
+              <a:rPr lang="en-US" sz="1600" dirty="0" smtClean="0"/>
+              <a:t>: Nguyen Van A: hang F</a:t>
+            </a:r>
+            <a:endParaRPr lang="en-US" sz="1600" dirty="0"/>
           </a:p>
           <a:p>
             <a:pPr marL="800100" lvl="1" indent="-342900">
@@ -22615,7 +22615,7 @@
         <p:spPr>
           <a:xfrm>
             <a:off x="-9334" y="914400"/>
-            <a:ext cx="9153334" cy="3416320"/>
+            <a:ext cx="9153334" cy="4524315"/>
           </a:xfrm>
           <a:prstGeom prst="rect">
             <a:avLst/>
@@ -22904,10 +22904,155 @@
               <a:rPr lang="vi-VN" sz="2400" dirty="0">
                 <a:cs typeface="Arial" panose="020B0604020202020204" pitchFamily="34" charset="0"/>
               </a:rPr>
-              <a:t>đồng cho bất kỳ phút gọi nào sau 200 phút đầu tiên.</a:t>
+              <a:t>đồng cho bất kỳ phút gọi nào sau 200 phút đầu tiên</a:t>
+            </a:r>
+            <a:r>
+              <a:rPr lang="vi-VN" sz="2400" dirty="0" smtClean="0">
+                <a:cs typeface="Arial" panose="020B0604020202020204" pitchFamily="34" charset="0"/>
+              </a:rPr>
+              <a:t>.</a:t>
             </a:r>
             <a:endParaRPr lang="en-US" sz="2400" dirty="0">
               <a:latin typeface="Arial" panose="020B0604020202020204" pitchFamily="34" charset="0"/>
+              <a:cs typeface="Arial" panose="020B0604020202020204" pitchFamily="34" charset="0"/>
+            </a:endParaRPr>
+          </a:p>
+          <a:p>
+            <a:pPr lvl="1"/>
+            <a:endParaRPr lang="en-US" sz="2400" dirty="0">
+              <a:latin typeface="Arial" panose="020B0604020202020204" pitchFamily="34" charset="0"/>
+              <a:cs typeface="Arial" panose="020B0604020202020204" pitchFamily="34" charset="0"/>
+            </a:endParaRPr>
+          </a:p>
+          <a:p>
+            <a:pPr lvl="1"/>
+            <a:r>
+              <a:rPr lang="en-US" sz="2400" dirty="0" err="1" smtClean="0">
+                <a:latin typeface="Arial" panose="020B0604020202020204" pitchFamily="34" charset="0"/>
+                <a:cs typeface="Arial" panose="020B0604020202020204" pitchFamily="34" charset="0"/>
+              </a:rPr>
+              <a:t>Nhap</a:t>
+            </a:r>
+            <a:r>
+              <a:rPr lang="en-US" sz="2400" dirty="0" smtClean="0">
+                <a:latin typeface="Arial" panose="020B0604020202020204" pitchFamily="34" charset="0"/>
+                <a:cs typeface="Arial" panose="020B0604020202020204" pitchFamily="34" charset="0"/>
+              </a:rPr>
+              <a:t> </a:t>
+            </a:r>
+            <a:r>
+              <a:rPr lang="en-US" sz="2400" dirty="0" err="1" smtClean="0">
+                <a:latin typeface="Arial" panose="020B0604020202020204" pitchFamily="34" charset="0"/>
+                <a:cs typeface="Arial" panose="020B0604020202020204" pitchFamily="34" charset="0"/>
+              </a:rPr>
+              <a:t>vao</a:t>
+            </a:r>
+            <a:r>
+              <a:rPr lang="en-US" sz="2400" dirty="0" smtClean="0">
+                <a:latin typeface="Arial" panose="020B0604020202020204" pitchFamily="34" charset="0"/>
+                <a:cs typeface="Arial" panose="020B0604020202020204" pitchFamily="34" charset="0"/>
+              </a:rPr>
+              <a:t>: </a:t>
+            </a:r>
+            <a:r>
+              <a:rPr lang="en-US" sz="2400" dirty="0" err="1" smtClean="0">
+                <a:latin typeface="Arial" panose="020B0604020202020204" pitchFamily="34" charset="0"/>
+                <a:cs typeface="Arial" panose="020B0604020202020204" pitchFamily="34" charset="0"/>
+              </a:rPr>
+              <a:t>thoi</a:t>
+            </a:r>
+            <a:r>
+              <a:rPr lang="en-US" sz="2400" dirty="0" smtClean="0">
+                <a:latin typeface="Arial" panose="020B0604020202020204" pitchFamily="34" charset="0"/>
+                <a:cs typeface="Arial" panose="020B0604020202020204" pitchFamily="34" charset="0"/>
+              </a:rPr>
+              <a:t> </a:t>
+            </a:r>
+            <a:r>
+              <a:rPr lang="en-US" sz="2400" dirty="0" err="1" smtClean="0">
+                <a:latin typeface="Arial" panose="020B0604020202020204" pitchFamily="34" charset="0"/>
+                <a:cs typeface="Arial" panose="020B0604020202020204" pitchFamily="34" charset="0"/>
+              </a:rPr>
+              <a:t>gian</a:t>
+            </a:r>
+            <a:r>
+              <a:rPr lang="en-US" sz="2400" dirty="0" smtClean="0">
+                <a:latin typeface="Arial" panose="020B0604020202020204" pitchFamily="34" charset="0"/>
+                <a:cs typeface="Arial" panose="020B0604020202020204" pitchFamily="34" charset="0"/>
+              </a:rPr>
+              <a:t> </a:t>
+            </a:r>
+            <a:r>
+              <a:rPr lang="en-US" sz="2400" dirty="0" err="1" smtClean="0">
+                <a:latin typeface="Arial" panose="020B0604020202020204" pitchFamily="34" charset="0"/>
+                <a:cs typeface="Arial" panose="020B0604020202020204" pitchFamily="34" charset="0"/>
+              </a:rPr>
+              <a:t>goi</a:t>
+            </a:r>
+            <a:endParaRPr lang="en-US" sz="2400" dirty="0" smtClean="0">
+              <a:latin typeface="Arial" panose="020B0604020202020204" pitchFamily="34" charset="0"/>
+              <a:cs typeface="Arial" panose="020B0604020202020204" pitchFamily="34" charset="0"/>
+            </a:endParaRPr>
+          </a:p>
+          <a:p>
+            <a:pPr lvl="1"/>
+            <a:r>
+              <a:rPr lang="en-US" sz="2400" dirty="0" smtClean="0">
+                <a:latin typeface="Arial" panose="020B0604020202020204" pitchFamily="34" charset="0"/>
+                <a:cs typeface="Arial" panose="020B0604020202020204" pitchFamily="34" charset="0"/>
+              </a:rPr>
+              <a:t>In </a:t>
+            </a:r>
+            <a:r>
+              <a:rPr lang="en-US" sz="2400" dirty="0" err="1" smtClean="0">
+                <a:latin typeface="Arial" panose="020B0604020202020204" pitchFamily="34" charset="0"/>
+                <a:cs typeface="Arial" panose="020B0604020202020204" pitchFamily="34" charset="0"/>
+              </a:rPr>
+              <a:t>ra</a:t>
+            </a:r>
+            <a:r>
+              <a:rPr lang="en-US" sz="2400" dirty="0" smtClean="0">
+                <a:latin typeface="Arial" panose="020B0604020202020204" pitchFamily="34" charset="0"/>
+                <a:cs typeface="Arial" panose="020B0604020202020204" pitchFamily="34" charset="0"/>
+              </a:rPr>
+              <a:t>: so </a:t>
+            </a:r>
+            <a:r>
+              <a:rPr lang="en-US" sz="2400" dirty="0" err="1" smtClean="0">
+                <a:latin typeface="Arial" panose="020B0604020202020204" pitchFamily="34" charset="0"/>
+                <a:cs typeface="Arial" panose="020B0604020202020204" pitchFamily="34" charset="0"/>
+              </a:rPr>
+              <a:t>tien</a:t>
+            </a:r>
+            <a:r>
+              <a:rPr lang="en-US" sz="2400" dirty="0" smtClean="0">
+                <a:latin typeface="Arial" panose="020B0604020202020204" pitchFamily="34" charset="0"/>
+                <a:cs typeface="Arial" panose="020B0604020202020204" pitchFamily="34" charset="0"/>
+              </a:rPr>
+              <a:t> </a:t>
+            </a:r>
+            <a:r>
+              <a:rPr lang="en-US" sz="2400" dirty="0" err="1" smtClean="0">
+                <a:latin typeface="Arial" panose="020B0604020202020204" pitchFamily="34" charset="0"/>
+                <a:cs typeface="Arial" panose="020B0604020202020204" pitchFamily="34" charset="0"/>
+              </a:rPr>
+              <a:t>tuong</a:t>
+            </a:r>
+            <a:r>
+              <a:rPr lang="en-US" sz="2400" dirty="0" smtClean="0">
+                <a:latin typeface="Arial" panose="020B0604020202020204" pitchFamily="34" charset="0"/>
+                <a:cs typeface="Arial" panose="020B0604020202020204" pitchFamily="34" charset="0"/>
+              </a:rPr>
+              <a:t> </a:t>
+            </a:r>
+            <a:r>
+              <a:rPr lang="en-US" sz="2400" dirty="0" err="1" smtClean="0">
+                <a:latin typeface="Arial" panose="020B0604020202020204" pitchFamily="34" charset="0"/>
+                <a:cs typeface="Arial" panose="020B0604020202020204" pitchFamily="34" charset="0"/>
+              </a:rPr>
+              <a:t>ung</a:t>
+            </a:r>
+            <a:endParaRPr lang="en-US" sz="2400" dirty="0" smtClean="0">
               <a:cs typeface="Arial" panose="020B0604020202020204" pitchFamily="34" charset="0"/>
             </a:endParaRPr>
           </a:p>

</xml_diff>